<commit_message>
hoan thien mo hinh cau truc
</commit_message>
<xml_diff>
--- a/[PTTKHT]_[NhomBKFS]_[97593]/MÔ HÌNH CẤU TRÚC.pptx
+++ b/[PTTKHT]_[NhomBKFS]_[97593]/MÔ HÌNH CẤU TRÚC.pptx
@@ -34,6 +34,7 @@
     <p:sldId id="286" r:id="rId28"/>
     <p:sldId id="287" r:id="rId29"/>
     <p:sldId id="288" r:id="rId30"/>
+    <p:sldId id="289" r:id="rId31"/>
   </p:sldIdLst>
   <p:sldSz cx="12192000" cy="6858000"/>
   <p:notesSz cx="6858000" cy="9144000"/>
@@ -26121,16 +26122,8 @@
 </file>
 
 <file path=ppt/slides/slide16.xml><?xml version="1.0" encoding="utf-8"?>
-<p:sld xmlns:a="http://schemas.openxmlformats.org/drawingml/2006/main" xmlns:r="http://schemas.openxmlformats.org/officeDocument/2006/relationships" xmlns:p="http://schemas.openxmlformats.org/presentationml/2006/main">
+<p:sld xmlns:a="http://schemas.openxmlformats.org/drawingml/2006/main" xmlns:r="http://schemas.openxmlformats.org/officeDocument/2006/relationships" xmlns:p="http://schemas.openxmlformats.org/presentationml/2006/main" showMasterSp="0">
   <p:cSld>
-    <p:bg>
-      <p:bgPr>
-        <a:solidFill>
-          <a:schemeClr val="bg1"/>
-        </a:solidFill>
-        <a:effectLst/>
-      </p:bgPr>
-    </p:bg>
     <p:spTree>
       <p:nvGrpSpPr>
         <p:cNvPr id="1" name=""/>
@@ -26247,16 +26240,8 @@
 </file>
 
 <file path=ppt/slides/slide17.xml><?xml version="1.0" encoding="utf-8"?>
-<p:sld xmlns:a="http://schemas.openxmlformats.org/drawingml/2006/main" xmlns:r="http://schemas.openxmlformats.org/officeDocument/2006/relationships" xmlns:p="http://schemas.openxmlformats.org/presentationml/2006/main">
+<p:sld xmlns:a="http://schemas.openxmlformats.org/drawingml/2006/main" xmlns:r="http://schemas.openxmlformats.org/officeDocument/2006/relationships" xmlns:p="http://schemas.openxmlformats.org/presentationml/2006/main" showMasterSp="0">
   <p:cSld>
-    <p:bg>
-      <p:bgPr>
-        <a:solidFill>
-          <a:schemeClr val="bg1"/>
-        </a:solidFill>
-        <a:effectLst/>
-      </p:bgPr>
-    </p:bg>
     <p:spTree>
       <p:nvGrpSpPr>
         <p:cNvPr id="1" name=""/>
@@ -26383,16 +26368,8 @@
 </file>
 
 <file path=ppt/slides/slide18.xml><?xml version="1.0" encoding="utf-8"?>
-<p:sld xmlns:a="http://schemas.openxmlformats.org/drawingml/2006/main" xmlns:r="http://schemas.openxmlformats.org/officeDocument/2006/relationships" xmlns:p="http://schemas.openxmlformats.org/presentationml/2006/main">
+<p:sld xmlns:a="http://schemas.openxmlformats.org/drawingml/2006/main" xmlns:r="http://schemas.openxmlformats.org/officeDocument/2006/relationships" xmlns:p="http://schemas.openxmlformats.org/presentationml/2006/main" showMasterSp="0">
   <p:cSld>
-    <p:bg>
-      <p:bgPr>
-        <a:solidFill>
-          <a:schemeClr val="bg1"/>
-        </a:solidFill>
-        <a:effectLst/>
-      </p:bgPr>
-    </p:bg>
     <p:spTree>
       <p:nvGrpSpPr>
         <p:cNvPr id="1" name=""/>
@@ -26527,16 +26504,8 @@
 </file>
 
 <file path=ppt/slides/slide19.xml><?xml version="1.0" encoding="utf-8"?>
-<p:sld xmlns:a="http://schemas.openxmlformats.org/drawingml/2006/main" xmlns:r="http://schemas.openxmlformats.org/officeDocument/2006/relationships" xmlns:p="http://schemas.openxmlformats.org/presentationml/2006/main">
+<p:sld xmlns:a="http://schemas.openxmlformats.org/drawingml/2006/main" xmlns:r="http://schemas.openxmlformats.org/officeDocument/2006/relationships" xmlns:p="http://schemas.openxmlformats.org/presentationml/2006/main" showMasterSp="0">
   <p:cSld>
-    <p:bg>
-      <p:bgPr>
-        <a:solidFill>
-          <a:schemeClr val="bg1"/>
-        </a:solidFill>
-        <a:effectLst/>
-      </p:bgPr>
-    </p:bg>
     <p:spTree>
       <p:nvGrpSpPr>
         <p:cNvPr id="1" name=""/>
@@ -27188,7 +27157,7 @@
 </file>
 
 <file path=ppt/slides/slide20.xml><?xml version="1.0" encoding="utf-8"?>
-<p:sld xmlns:a="http://schemas.openxmlformats.org/drawingml/2006/main" xmlns:r="http://schemas.openxmlformats.org/officeDocument/2006/relationships" xmlns:p="http://schemas.openxmlformats.org/presentationml/2006/main">
+<p:sld xmlns:a="http://schemas.openxmlformats.org/drawingml/2006/main" xmlns:r="http://schemas.openxmlformats.org/officeDocument/2006/relationships" xmlns:p="http://schemas.openxmlformats.org/presentationml/2006/main" showMasterSp="0">
   <p:cSld>
     <p:spTree>
       <p:nvGrpSpPr>
@@ -27321,7 +27290,7 @@
 </file>
 
 <file path=ppt/slides/slide21.xml><?xml version="1.0" encoding="utf-8"?>
-<p:sld xmlns:a="http://schemas.openxmlformats.org/drawingml/2006/main" xmlns:r="http://schemas.openxmlformats.org/officeDocument/2006/relationships" xmlns:p="http://schemas.openxmlformats.org/presentationml/2006/main">
+<p:sld xmlns:a="http://schemas.openxmlformats.org/drawingml/2006/main" xmlns:r="http://schemas.openxmlformats.org/officeDocument/2006/relationships" xmlns:p="http://schemas.openxmlformats.org/presentationml/2006/main" showMasterSp="0">
   <p:cSld>
     <p:spTree>
       <p:nvGrpSpPr>
@@ -27454,7 +27423,7 @@
 </file>
 
 <file path=ppt/slides/slide22.xml><?xml version="1.0" encoding="utf-8"?>
-<p:sld xmlns:a="http://schemas.openxmlformats.org/drawingml/2006/main" xmlns:r="http://schemas.openxmlformats.org/officeDocument/2006/relationships" xmlns:p="http://schemas.openxmlformats.org/presentationml/2006/main">
+<p:sld xmlns:a="http://schemas.openxmlformats.org/drawingml/2006/main" xmlns:r="http://schemas.openxmlformats.org/officeDocument/2006/relationships" xmlns:p="http://schemas.openxmlformats.org/presentationml/2006/main" showMasterSp="0">
   <p:cSld>
     <p:spTree>
       <p:nvGrpSpPr>
@@ -27587,7 +27556,7 @@
 </file>
 
 <file path=ppt/slides/slide23.xml><?xml version="1.0" encoding="utf-8"?>
-<p:sld xmlns:a="http://schemas.openxmlformats.org/drawingml/2006/main" xmlns:r="http://schemas.openxmlformats.org/officeDocument/2006/relationships" xmlns:p="http://schemas.openxmlformats.org/presentationml/2006/main">
+<p:sld xmlns:a="http://schemas.openxmlformats.org/drawingml/2006/main" xmlns:r="http://schemas.openxmlformats.org/officeDocument/2006/relationships" xmlns:p="http://schemas.openxmlformats.org/presentationml/2006/main" showMasterSp="0">
   <p:cSld>
     <p:spTree>
       <p:nvGrpSpPr>
@@ -27720,7 +27689,7 @@
 </file>
 
 <file path=ppt/slides/slide24.xml><?xml version="1.0" encoding="utf-8"?>
-<p:sld xmlns:a="http://schemas.openxmlformats.org/drawingml/2006/main" xmlns:r="http://schemas.openxmlformats.org/officeDocument/2006/relationships" xmlns:p="http://schemas.openxmlformats.org/presentationml/2006/main">
+<p:sld xmlns:a="http://schemas.openxmlformats.org/drawingml/2006/main" xmlns:r="http://schemas.openxmlformats.org/officeDocument/2006/relationships" xmlns:p="http://schemas.openxmlformats.org/presentationml/2006/main" showMasterSp="0">
   <p:cSld>
     <p:spTree>
       <p:nvGrpSpPr>
@@ -27853,7 +27822,7 @@
 </file>
 
 <file path=ppt/slides/slide25.xml><?xml version="1.0" encoding="utf-8"?>
-<p:sld xmlns:a="http://schemas.openxmlformats.org/drawingml/2006/main" xmlns:r="http://schemas.openxmlformats.org/officeDocument/2006/relationships" xmlns:p="http://schemas.openxmlformats.org/presentationml/2006/main">
+<p:sld xmlns:a="http://schemas.openxmlformats.org/drawingml/2006/main" xmlns:r="http://schemas.openxmlformats.org/officeDocument/2006/relationships" xmlns:p="http://schemas.openxmlformats.org/presentationml/2006/main" showMasterSp="0">
   <p:cSld>
     <p:spTree>
       <p:nvGrpSpPr>
@@ -27986,7 +27955,7 @@
 </file>
 
 <file path=ppt/slides/slide26.xml><?xml version="1.0" encoding="utf-8"?>
-<p:sld xmlns:a="http://schemas.openxmlformats.org/drawingml/2006/main" xmlns:r="http://schemas.openxmlformats.org/officeDocument/2006/relationships" xmlns:p="http://schemas.openxmlformats.org/presentationml/2006/main">
+<p:sld xmlns:a="http://schemas.openxmlformats.org/drawingml/2006/main" xmlns:r="http://schemas.openxmlformats.org/officeDocument/2006/relationships" xmlns:p="http://schemas.openxmlformats.org/presentationml/2006/main" showMasterSp="0">
   <p:cSld>
     <p:spTree>
       <p:nvGrpSpPr>
@@ -28119,7 +28088,7 @@
 </file>
 
 <file path=ppt/slides/slide27.xml><?xml version="1.0" encoding="utf-8"?>
-<p:sld xmlns:a="http://schemas.openxmlformats.org/drawingml/2006/main" xmlns:r="http://schemas.openxmlformats.org/officeDocument/2006/relationships" xmlns:p="http://schemas.openxmlformats.org/presentationml/2006/main">
+<p:sld xmlns:a="http://schemas.openxmlformats.org/drawingml/2006/main" xmlns:r="http://schemas.openxmlformats.org/officeDocument/2006/relationships" xmlns:p="http://schemas.openxmlformats.org/presentationml/2006/main" showMasterSp="0">
   <p:cSld>
     <p:spTree>
       <p:nvGrpSpPr>
@@ -28269,7 +28238,7 @@
 </file>
 
 <file path=ppt/slides/slide28.xml><?xml version="1.0" encoding="utf-8"?>
-<p:sld xmlns:a="http://schemas.openxmlformats.org/drawingml/2006/main" xmlns:r="http://schemas.openxmlformats.org/officeDocument/2006/relationships" xmlns:p="http://schemas.openxmlformats.org/presentationml/2006/main">
+<p:sld xmlns:a="http://schemas.openxmlformats.org/drawingml/2006/main" xmlns:r="http://schemas.openxmlformats.org/officeDocument/2006/relationships" xmlns:p="http://schemas.openxmlformats.org/presentationml/2006/main" showMasterSp="0">
   <p:cSld>
     <p:spTree>
       <p:nvGrpSpPr>
@@ -28392,6 +28361,142 @@
     <p:extLst>
       <p:ext uri="{BB962C8B-B14F-4D97-AF65-F5344CB8AC3E}">
         <p14:creationId xmlns:p14="http://schemas.microsoft.com/office/powerpoint/2010/main" val="114418409"/>
+      </p:ext>
+    </p:extLst>
+  </p:cSld>
+  <p:clrMapOvr>
+    <a:masterClrMapping/>
+  </p:clrMapOvr>
+</p:sld>
+</file>
+
+<file path=ppt/slides/slide29.xml><?xml version="1.0" encoding="utf-8"?>
+<p:sld xmlns:a="http://schemas.openxmlformats.org/drawingml/2006/main" xmlns:r="http://schemas.openxmlformats.org/officeDocument/2006/relationships" xmlns:p="http://schemas.openxmlformats.org/presentationml/2006/main" showMasterSp="0">
+  <p:cSld>
+    <p:spTree>
+      <p:nvGrpSpPr>
+        <p:cNvPr id="1" name=""/>
+        <p:cNvGrpSpPr/>
+        <p:nvPr/>
+      </p:nvGrpSpPr>
+      <p:grpSpPr>
+        <a:xfrm>
+          <a:off x="0" y="0"/>
+          <a:ext cx="0" cy="0"/>
+          <a:chOff x="0" y="0"/>
+          <a:chExt cx="0" cy="0"/>
+        </a:xfrm>
+      </p:grpSpPr>
+      <p:pic>
+        <p:nvPicPr>
+          <p:cNvPr id="3" name="Hình ảnh 2" descr="Ảnh có chứa ảnh chụp màn hình&#10;&#10;Mô tả được tạo với mức tin cậy rất cao">
+            <a:extLst>
+              <a:ext uri="{FF2B5EF4-FFF2-40B4-BE49-F238E27FC236}">
+                <a16:creationId xmlns:a16="http://schemas.microsoft.com/office/drawing/2014/main" id="{03AE785B-58DF-4845-9653-FA6B16A09F1F}"/>
+              </a:ext>
+            </a:extLst>
+          </p:cNvPr>
+          <p:cNvPicPr>
+            <a:picLocks noChangeAspect="1"/>
+          </p:cNvPicPr>
+          <p:nvPr/>
+        </p:nvPicPr>
+        <p:blipFill>
+          <a:blip r:embed="rId2">
+            <a:extLst>
+              <a:ext uri="{28A0092B-C50C-407E-A947-70E740481C1C}">
+                <a14:useLocalDpi xmlns:a14="http://schemas.microsoft.com/office/drawing/2010/main" val="0"/>
+              </a:ext>
+            </a:extLst>
+          </a:blip>
+          <a:stretch>
+            <a:fillRect/>
+          </a:stretch>
+        </p:blipFill>
+        <p:spPr>
+          <a:xfrm>
+            <a:off x="643467" y="1097671"/>
+            <a:ext cx="10905066" cy="3844035"/>
+          </a:xfrm>
+          <a:prstGeom prst="rect">
+            <a:avLst/>
+          </a:prstGeom>
+        </p:spPr>
+      </p:pic>
+      <p:sp>
+        <p:nvSpPr>
+          <p:cNvPr id="5" name="Hộp Văn bản 4">
+            <a:extLst>
+              <a:ext uri="{FF2B5EF4-FFF2-40B4-BE49-F238E27FC236}">
+                <a16:creationId xmlns:a16="http://schemas.microsoft.com/office/drawing/2014/main" id="{C57311FA-B297-4C5B-AA77-3247994834BB}"/>
+              </a:ext>
+            </a:extLst>
+          </p:cNvPr>
+          <p:cNvSpPr txBox="1"/>
+          <p:nvPr/>
+        </p:nvSpPr>
+        <p:spPr>
+          <a:xfrm>
+            <a:off x="838200" y="5534025"/>
+            <a:ext cx="10515600" cy="822326"/>
+          </a:xfrm>
+          <a:prstGeom prst="rect">
+            <a:avLst/>
+          </a:prstGeom>
+        </p:spPr>
+        <p:txBody>
+          <a:bodyPr vert="horz" lIns="91440" tIns="45720" rIns="91440" bIns="45720" rtlCol="0" anchor="ctr">
+            <a:normAutofit/>
+          </a:bodyPr>
+          <a:lstStyle/>
+          <a:p>
+            <a:pPr marL="0" marR="0" lvl="0" indent="0" algn="ctr" fontAlgn="auto">
+              <a:lnSpc>
+                <a:spcPct val="90000"/>
+              </a:lnSpc>
+              <a:spcBef>
+                <a:spcPct val="0"/>
+              </a:spcBef>
+              <a:spcAft>
+                <a:spcPts val="600"/>
+              </a:spcAft>
+              <a:buClrTx/>
+              <a:buSzTx/>
+              <a:tabLst/>
+              <a:defRPr/>
+            </a:pPr>
+            <a:r>
+              <a:rPr lang="en-US" sz="4400" kern="1200">
+                <a:solidFill>
+                  <a:schemeClr val="tx1"/>
+                </a:solidFill>
+                <a:latin typeface="+mj-lt"/>
+                <a:ea typeface="+mj-ea"/>
+                <a:cs typeface="+mj-cs"/>
+              </a:rPr>
+              <a:t>Quản lý bài viết</a:t>
+            </a:r>
+            <a:endParaRPr kumimoji="0" lang="en-US" sz="4400" b="0" i="0" u="none" strike="noStrike" kern="1200" cap="none" spc="0" normalizeH="0" baseline="0" noProof="0">
+              <a:ln>
+                <a:noFill/>
+              </a:ln>
+              <a:solidFill>
+                <a:schemeClr val="tx1"/>
+              </a:solidFill>
+              <a:effectLst/>
+              <a:uLnTx/>
+              <a:uFillTx/>
+              <a:latin typeface="+mj-lt"/>
+              <a:ea typeface="+mj-ea"/>
+              <a:cs typeface="+mj-cs"/>
+            </a:endParaRPr>
+          </a:p>
+        </p:txBody>
+      </p:sp>
+    </p:spTree>
+    <p:extLst>
+      <p:ext uri="{BB962C8B-B14F-4D97-AF65-F5344CB8AC3E}">
+        <p14:creationId xmlns:p14="http://schemas.microsoft.com/office/powerpoint/2010/main" val="4292544312"/>
       </p:ext>
     </p:extLst>
   </p:cSld>

</xml_diff>